<commit_message>
adding slides project makes
</commit_message>
<xml_diff>
--- a/ProjectsOverview/SOC_PhD_Proposal_Clickable.pptx
+++ b/ProjectsOverview/SOC_PhD_Proposal_Clickable.pptx
@@ -10,11 +10,9 @@
     <p:sldId id="258" r:id="rId4"/>
     <p:sldId id="259" r:id="rId5"/>
     <p:sldId id="260" r:id="rId6"/>
-    <p:sldId id="261" r:id="rId7"/>
-    <p:sldId id="262" r:id="rId8"/>
   </p:sldIdLst>
   <p:notesMasterIdLst>
-    <p:notesMasterId r:id="rId9"/>
+    <p:notesMasterId r:id="rId7"/>
   </p:notesMasterIdLst>
   <p:sldSz cx="12188952" cy="6858000"/>
   <p:notesSz cx="6858000" cy="12188952"/>
@@ -912,186 +910,6 @@
 </p:notes>
 </file>
 
-<file path=ppt/notesSlides/notesSlide6.xml><?xml version="1.0" encoding="utf-8"?>
-<p:notes xmlns:a="http://schemas.openxmlformats.org/drawingml/2006/main" xmlns:r="http://schemas.openxmlformats.org/officeDocument/2006/relationships" xmlns:p="http://schemas.openxmlformats.org/presentationml/2006/main">
-  <p:cSld>
-    <p:spTree>
-      <p:nvGrpSpPr>
-        <p:cNvPr id="1" name=""/>
-        <p:cNvGrpSpPr/>
-        <p:nvPr/>
-      </p:nvGrpSpPr>
-      <p:grpSpPr>
-        <a:xfrm>
-          <a:off x="0" y="0"/>
-          <a:ext cx="0" cy="0"/>
-          <a:chOff x="0" y="0"/>
-          <a:chExt cx="0" cy="0"/>
-        </a:xfrm>
-      </p:grpSpPr>
-      <p:sp>
-        <p:nvSpPr>
-          <p:cNvPr id="2" name="Slide Image Placeholder 1"/>
-          <p:cNvSpPr>
-            <a:spLocks noGrp="1" noRot="1" noChangeAspect="1"/>
-          </p:cNvSpPr>
-          <p:nvPr>
-            <p:ph type="sldImg"/>
-          </p:nvPr>
-        </p:nvSpPr>
-        <p:spPr/>
-      </p:sp>
-      <p:sp>
-        <p:nvSpPr>
-          <p:cNvPr id="3" name="Notes Placeholder 2"/>
-          <p:cNvSpPr>
-            <a:spLocks noGrp="1"/>
-          </p:cNvSpPr>
-          <p:nvPr>
-            <p:ph type="body" idx="1"/>
-          </p:nvPr>
-        </p:nvSpPr>
-        <p:spPr/>
-        <p:txBody>
-          <a:bodyPr/>
-          <a:lstStyle/>
-          <a:p>
-            <a:r>
-              <a:rPr lang="en-US" dirty="0"/>
-              <a:t>SOC PhD Proposal – Slide 6
-Explain this section as shown.
-Links are clickable in presentation mode.</a:t>
-            </a:r>
-            <a:endParaRPr lang="en-US" dirty="0"/>
-          </a:p>
-        </p:txBody>
-      </p:sp>
-      <p:sp>
-        <p:nvSpPr>
-          <p:cNvPr id="4" name="Slide Number Placeholder 3"/>
-          <p:cNvSpPr>
-            <a:spLocks noGrp="1"/>
-          </p:cNvSpPr>
-          <p:nvPr>
-            <p:ph type="sldNum" sz="quarter" idx="10"/>
-          </p:nvPr>
-        </p:nvSpPr>
-        <p:spPr/>
-        <p:txBody>
-          <a:bodyPr/>
-          <a:lstStyle/>
-          <a:p>
-            <a:fld id="{F7021451-1387-4CA6-816F-3879F97B5CBC}" type="slidenum">
-              <a:rPr lang="en-US"/>
-              <a:t>6</a:t>
-            </a:fld>
-            <a:endParaRPr lang="en-US"/>
-          </a:p>
-        </p:txBody>
-      </p:sp>
-    </p:spTree>
-    <p:extLst>
-      <p:ext uri="{BB962C8B-B14F-4D97-AF65-F5344CB8AC3E}">
-        <p14:creationId xmlns:p14="http://schemas.microsoft.com/office/powerpoint/2010/main" val="1024086991"/>
-      </p:ext>
-    </p:extLst>
-  </p:cSld>
-  <p:clrMapOvr>
-    <a:masterClrMapping/>
-  </p:clrMapOvr>
-</p:notes>
-</file>
-
-<file path=ppt/notesSlides/notesSlide7.xml><?xml version="1.0" encoding="utf-8"?>
-<p:notes xmlns:a="http://schemas.openxmlformats.org/drawingml/2006/main" xmlns:r="http://schemas.openxmlformats.org/officeDocument/2006/relationships" xmlns:p="http://schemas.openxmlformats.org/presentationml/2006/main">
-  <p:cSld>
-    <p:spTree>
-      <p:nvGrpSpPr>
-        <p:cNvPr id="1" name=""/>
-        <p:cNvGrpSpPr/>
-        <p:nvPr/>
-      </p:nvGrpSpPr>
-      <p:grpSpPr>
-        <a:xfrm>
-          <a:off x="0" y="0"/>
-          <a:ext cx="0" cy="0"/>
-          <a:chOff x="0" y="0"/>
-          <a:chExt cx="0" cy="0"/>
-        </a:xfrm>
-      </p:grpSpPr>
-      <p:sp>
-        <p:nvSpPr>
-          <p:cNvPr id="2" name="Slide Image Placeholder 1"/>
-          <p:cNvSpPr>
-            <a:spLocks noGrp="1" noRot="1" noChangeAspect="1"/>
-          </p:cNvSpPr>
-          <p:nvPr>
-            <p:ph type="sldImg"/>
-          </p:nvPr>
-        </p:nvSpPr>
-        <p:spPr/>
-      </p:sp>
-      <p:sp>
-        <p:nvSpPr>
-          <p:cNvPr id="3" name="Notes Placeholder 2"/>
-          <p:cNvSpPr>
-            <a:spLocks noGrp="1"/>
-          </p:cNvSpPr>
-          <p:nvPr>
-            <p:ph type="body" idx="1"/>
-          </p:nvPr>
-        </p:nvSpPr>
-        <p:spPr/>
-        <p:txBody>
-          <a:bodyPr/>
-          <a:lstStyle/>
-          <a:p>
-            <a:r>
-              <a:rPr lang="en-US" dirty="0"/>
-              <a:t>SOC PhD Proposal – Slide 7
-Explain this section as shown.
-Links are clickable in presentation mode.</a:t>
-            </a:r>
-            <a:endParaRPr lang="en-US" dirty="0"/>
-          </a:p>
-        </p:txBody>
-      </p:sp>
-      <p:sp>
-        <p:nvSpPr>
-          <p:cNvPr id="4" name="Slide Number Placeholder 3"/>
-          <p:cNvSpPr>
-            <a:spLocks noGrp="1"/>
-          </p:cNvSpPr>
-          <p:nvPr>
-            <p:ph type="sldNum" sz="quarter" idx="10"/>
-          </p:nvPr>
-        </p:nvSpPr>
-        <p:spPr/>
-        <p:txBody>
-          <a:bodyPr/>
-          <a:lstStyle/>
-          <a:p>
-            <a:fld id="{F7021451-1387-4CA6-816F-3879F97B5CBC}" type="slidenum">
-              <a:rPr lang="en-US"/>
-              <a:t>7</a:t>
-            </a:fld>
-            <a:endParaRPr lang="en-US"/>
-          </a:p>
-        </p:txBody>
-      </p:sp>
-    </p:spTree>
-    <p:extLst>
-      <p:ext uri="{BB962C8B-B14F-4D97-AF65-F5344CB8AC3E}">
-        <p14:creationId xmlns:p14="http://schemas.microsoft.com/office/powerpoint/2010/main" val="1024086991"/>
-      </p:ext>
-    </p:extLst>
-  </p:cSld>
-  <p:clrMapOvr>
-    <a:masterClrMapping/>
-  </p:clrMapOvr>
-</p:notes>
-</file>
-
 <file path=ppt/slideLayouts/slideLayout1.xml><?xml version="1.0" encoding="utf-8"?>
 <p:sldLayout xmlns:a="http://schemas.openxmlformats.org/drawingml/2006/main" xmlns:r="http://schemas.openxmlformats.org/officeDocument/2006/relationships" xmlns:p="http://schemas.openxmlformats.org/presentationml/2006/main" preserve="1">
   <p:cSld name="DEFAULT">
@@ -1448,8 +1266,8 @@
         </p:nvSpPr>
         <p:spPr>
           <a:xfrm>
-            <a:off x="1124363" y="6094115"/>
-            <a:ext cx="757247" cy="120650"/>
+            <a:off x="1257184" y="5349875"/>
+            <a:ext cx="528505" cy="101600"/>
           </a:xfrm>
           <a:prstGeom prst="rect">
             <a:avLst/>
@@ -1488,8 +1306,8 @@
         </p:nvSpPr>
         <p:spPr>
           <a:xfrm>
-            <a:off x="1124363" y="12795052"/>
-            <a:ext cx="958313" cy="120650"/>
+            <a:off x="1887264" y="5349875"/>
+            <a:ext cx="649125" cy="101600"/>
           </a:xfrm>
           <a:prstGeom prst="rect">
             <a:avLst/>
@@ -1528,8 +1346,8 @@
         </p:nvSpPr>
         <p:spPr>
           <a:xfrm>
-            <a:off x="1208182" y="20418425"/>
-            <a:ext cx="616590" cy="127000"/>
+            <a:off x="1257184" y="12538075"/>
+            <a:ext cx="649125" cy="101600"/>
           </a:xfrm>
           <a:prstGeom prst="rect">
             <a:avLst/>
@@ -1568,8 +1386,8 @@
         </p:nvSpPr>
         <p:spPr>
           <a:xfrm>
-            <a:off x="1926346" y="20418425"/>
-            <a:ext cx="656565" cy="127000"/>
+            <a:off x="2007884" y="12538075"/>
+            <a:ext cx="821425" cy="101600"/>
           </a:xfrm>
           <a:prstGeom prst="rect">
             <a:avLst/>
@@ -1608,128 +1426,8 @@
         </p:nvSpPr>
         <p:spPr>
           <a:xfrm>
-            <a:off x="2684486" y="20418425"/>
-            <a:ext cx="901772" cy="127000"/>
-          </a:xfrm>
-          <a:prstGeom prst="rect">
-            <a:avLst/>
-          </a:prstGeom>
-          <a:solidFill>
-            <a:srgbClr val="FFFFFF">
-              <a:alpha val="0"/>
-            </a:srgbClr>
-          </a:solidFill>
-          <a:ln/>
-        </p:spPr>
-        <p:txBody>
-          <a:bodyPr wrap="square" rtlCol="0" anchor="ctr"/>
-          <a:lstStyle/>
-          <a:p>
-            <a:pPr indent="0" marL="0">
-              <a:buNone/>
-            </a:pPr>
-            <a:r>
-              <a:rPr lang="en-US" dirty="0">
-                <a:solidFill>
-                  <a:srgbClr val="000000"/>
-                </a:solidFill>
-              </a:rPr>
-              <a:t> </a:t>
-            </a:r>
-            <a:endParaRPr lang="en-US" dirty="0"/>
-          </a:p>
-        </p:txBody>
-      </p:sp>
-      <p:sp>
-        <p:nvSpPr>
-          <p:cNvPr id="8" name="Text 5"/>
-          <p:cNvSpPr/>
-          <p:nvPr/>
-        </p:nvSpPr>
-        <p:spPr>
-          <a:xfrm>
-            <a:off x="1208182" y="28171775"/>
-            <a:ext cx="713204" cy="127000"/>
-          </a:xfrm>
-          <a:prstGeom prst="rect">
-            <a:avLst/>
-          </a:prstGeom>
-          <a:solidFill>
-            <a:srgbClr val="FFFFFF">
-              <a:alpha val="0"/>
-            </a:srgbClr>
-          </a:solidFill>
-          <a:ln/>
-        </p:spPr>
-        <p:txBody>
-          <a:bodyPr wrap="square" rtlCol="0" anchor="ctr"/>
-          <a:lstStyle/>
-          <a:p>
-            <a:pPr indent="0" marL="0">
-              <a:buNone/>
-            </a:pPr>
-            <a:r>
-              <a:rPr lang="en-US" dirty="0">
-                <a:solidFill>
-                  <a:srgbClr val="000000"/>
-                </a:solidFill>
-              </a:rPr>
-              <a:t> </a:t>
-            </a:r>
-            <a:endParaRPr lang="en-US" dirty="0"/>
-          </a:p>
-        </p:txBody>
-      </p:sp>
-      <p:sp>
-        <p:nvSpPr>
-          <p:cNvPr id="9" name="Text 6"/>
-          <p:cNvSpPr/>
-          <p:nvPr/>
-        </p:nvSpPr>
-        <p:spPr>
-          <a:xfrm>
-            <a:off x="2022961" y="28171775"/>
-            <a:ext cx="710030" cy="127000"/>
-          </a:xfrm>
-          <a:prstGeom prst="rect">
-            <a:avLst/>
-          </a:prstGeom>
-          <a:solidFill>
-            <a:srgbClr val="FFFFFF">
-              <a:alpha val="0"/>
-            </a:srgbClr>
-          </a:solidFill>
-          <a:ln/>
-        </p:spPr>
-        <p:txBody>
-          <a:bodyPr wrap="square" rtlCol="0" anchor="ctr"/>
-          <a:lstStyle/>
-          <a:p>
-            <a:pPr indent="0" marL="0">
-              <a:buNone/>
-            </a:pPr>
-            <a:r>
-              <a:rPr lang="en-US" dirty="0">
-                <a:solidFill>
-                  <a:srgbClr val="000000"/>
-                </a:solidFill>
-              </a:rPr>
-              <a:t> </a:t>
-            </a:r>
-            <a:endParaRPr lang="en-US" dirty="0"/>
-          </a:p>
-        </p:txBody>
-      </p:sp>
-      <p:sp>
-        <p:nvSpPr>
-          <p:cNvPr id="10" name="Text 7"/>
-          <p:cNvSpPr/>
-          <p:nvPr/>
-        </p:nvSpPr>
-        <p:spPr>
-          <a:xfrm>
-            <a:off x="609448" y="50888900"/>
-            <a:ext cx="10970057" cy="304800"/>
+            <a:off x="2930884" y="12538075"/>
+            <a:ext cx="611332" cy="101600"/>
           </a:xfrm>
           <a:prstGeom prst="rect">
             <a:avLst/>
@@ -1817,8 +1515,8 @@
         </p:nvSpPr>
         <p:spPr>
           <a:xfrm>
-            <a:off x="1124363" y="-1779885"/>
-            <a:ext cx="757247" cy="120650"/>
+            <a:off x="1257184" y="-2524125"/>
+            <a:ext cx="528505" cy="101600"/>
           </a:xfrm>
           <a:prstGeom prst="rect">
             <a:avLst/>
@@ -1857,8 +1555,8 @@
         </p:nvSpPr>
         <p:spPr>
           <a:xfrm>
-            <a:off x="1124363" y="4921052"/>
-            <a:ext cx="958313" cy="120650"/>
+            <a:off x="1887264" y="-2524125"/>
+            <a:ext cx="649125" cy="101600"/>
           </a:xfrm>
           <a:prstGeom prst="rect">
             <a:avLst/>
@@ -1897,8 +1595,8 @@
         </p:nvSpPr>
         <p:spPr>
           <a:xfrm>
-            <a:off x="1208182" y="12544425"/>
-            <a:ext cx="616590" cy="127000"/>
+            <a:off x="1257184" y="4664075"/>
+            <a:ext cx="649125" cy="101600"/>
           </a:xfrm>
           <a:prstGeom prst="rect">
             <a:avLst/>
@@ -1937,8 +1635,8 @@
         </p:nvSpPr>
         <p:spPr>
           <a:xfrm>
-            <a:off x="1926346" y="12544425"/>
-            <a:ext cx="656565" cy="127000"/>
+            <a:off x="2007884" y="4664075"/>
+            <a:ext cx="821425" cy="101600"/>
           </a:xfrm>
           <a:prstGeom prst="rect">
             <a:avLst/>
@@ -1977,128 +1675,8 @@
         </p:nvSpPr>
         <p:spPr>
           <a:xfrm>
-            <a:off x="2684486" y="12544425"/>
-            <a:ext cx="901772" cy="127000"/>
-          </a:xfrm>
-          <a:prstGeom prst="rect">
-            <a:avLst/>
-          </a:prstGeom>
-          <a:solidFill>
-            <a:srgbClr val="FFFFFF">
-              <a:alpha val="0"/>
-            </a:srgbClr>
-          </a:solidFill>
-          <a:ln/>
-        </p:spPr>
-        <p:txBody>
-          <a:bodyPr wrap="square" rtlCol="0" anchor="ctr"/>
-          <a:lstStyle/>
-          <a:p>
-            <a:pPr indent="0" marL="0">
-              <a:buNone/>
-            </a:pPr>
-            <a:r>
-              <a:rPr lang="en-US" dirty="0">
-                <a:solidFill>
-                  <a:srgbClr val="000000"/>
-                </a:solidFill>
-              </a:rPr>
-              <a:t> </a:t>
-            </a:r>
-            <a:endParaRPr lang="en-US" dirty="0"/>
-          </a:p>
-        </p:txBody>
-      </p:sp>
-      <p:sp>
-        <p:nvSpPr>
-          <p:cNvPr id="8" name="Text 5"/>
-          <p:cNvSpPr/>
-          <p:nvPr/>
-        </p:nvSpPr>
-        <p:spPr>
-          <a:xfrm>
-            <a:off x="1208182" y="20297775"/>
-            <a:ext cx="713204" cy="127000"/>
-          </a:xfrm>
-          <a:prstGeom prst="rect">
-            <a:avLst/>
-          </a:prstGeom>
-          <a:solidFill>
-            <a:srgbClr val="FFFFFF">
-              <a:alpha val="0"/>
-            </a:srgbClr>
-          </a:solidFill>
-          <a:ln/>
-        </p:spPr>
-        <p:txBody>
-          <a:bodyPr wrap="square" rtlCol="0" anchor="ctr"/>
-          <a:lstStyle/>
-          <a:p>
-            <a:pPr indent="0" marL="0">
-              <a:buNone/>
-            </a:pPr>
-            <a:r>
-              <a:rPr lang="en-US" dirty="0">
-                <a:solidFill>
-                  <a:srgbClr val="000000"/>
-                </a:solidFill>
-              </a:rPr>
-              <a:t> </a:t>
-            </a:r>
-            <a:endParaRPr lang="en-US" dirty="0"/>
-          </a:p>
-        </p:txBody>
-      </p:sp>
-      <p:sp>
-        <p:nvSpPr>
-          <p:cNvPr id="9" name="Text 6"/>
-          <p:cNvSpPr/>
-          <p:nvPr/>
-        </p:nvSpPr>
-        <p:spPr>
-          <a:xfrm>
-            <a:off x="2022961" y="20297775"/>
-            <a:ext cx="710030" cy="127000"/>
-          </a:xfrm>
-          <a:prstGeom prst="rect">
-            <a:avLst/>
-          </a:prstGeom>
-          <a:solidFill>
-            <a:srgbClr val="FFFFFF">
-              <a:alpha val="0"/>
-            </a:srgbClr>
-          </a:solidFill>
-          <a:ln/>
-        </p:spPr>
-        <p:txBody>
-          <a:bodyPr wrap="square" rtlCol="0" anchor="ctr"/>
-          <a:lstStyle/>
-          <a:p>
-            <a:pPr indent="0" marL="0">
-              <a:buNone/>
-            </a:pPr>
-            <a:r>
-              <a:rPr lang="en-US" dirty="0">
-                <a:solidFill>
-                  <a:srgbClr val="000000"/>
-                </a:solidFill>
-              </a:rPr>
-              <a:t> </a:t>
-            </a:r>
-            <a:endParaRPr lang="en-US" dirty="0"/>
-          </a:p>
-        </p:txBody>
-      </p:sp>
-      <p:sp>
-        <p:nvSpPr>
-          <p:cNvPr id="10" name="Text 7"/>
-          <p:cNvSpPr/>
-          <p:nvPr/>
-        </p:nvSpPr>
-        <p:spPr>
-          <a:xfrm>
-            <a:off x="609448" y="43014900"/>
-            <a:ext cx="10970057" cy="304800"/>
+            <a:off x="2930884" y="4664075"/>
+            <a:ext cx="611332" cy="101600"/>
           </a:xfrm>
           <a:prstGeom prst="rect">
             <a:avLst/>
@@ -2186,8 +1764,8 @@
         </p:nvSpPr>
         <p:spPr>
           <a:xfrm>
-            <a:off x="1124363" y="-9653885"/>
-            <a:ext cx="757247" cy="120650"/>
+            <a:off x="1257184" y="-10398125"/>
+            <a:ext cx="528505" cy="101600"/>
           </a:xfrm>
           <a:prstGeom prst="rect">
             <a:avLst/>
@@ -2226,8 +1804,8 @@
         </p:nvSpPr>
         <p:spPr>
           <a:xfrm>
-            <a:off x="1124363" y="-2952948"/>
-            <a:ext cx="958313" cy="120650"/>
+            <a:off x="1887264" y="-10398125"/>
+            <a:ext cx="649125" cy="101600"/>
           </a:xfrm>
           <a:prstGeom prst="rect">
             <a:avLst/>
@@ -2266,8 +1844,8 @@
         </p:nvSpPr>
         <p:spPr>
           <a:xfrm>
-            <a:off x="1208182" y="4670425"/>
-            <a:ext cx="616590" cy="127000"/>
+            <a:off x="1257184" y="-3209925"/>
+            <a:ext cx="649125" cy="101600"/>
           </a:xfrm>
           <a:prstGeom prst="rect">
             <a:avLst/>
@@ -2306,8 +1884,8 @@
         </p:nvSpPr>
         <p:spPr>
           <a:xfrm>
-            <a:off x="1926346" y="4670425"/>
-            <a:ext cx="656565" cy="127000"/>
+            <a:off x="2007884" y="-3209925"/>
+            <a:ext cx="821425" cy="101600"/>
           </a:xfrm>
           <a:prstGeom prst="rect">
             <a:avLst/>
@@ -2346,128 +1924,8 @@
         </p:nvSpPr>
         <p:spPr>
           <a:xfrm>
-            <a:off x="2684486" y="4670425"/>
-            <a:ext cx="901772" cy="127000"/>
-          </a:xfrm>
-          <a:prstGeom prst="rect">
-            <a:avLst/>
-          </a:prstGeom>
-          <a:solidFill>
-            <a:srgbClr val="FFFFFF">
-              <a:alpha val="0"/>
-            </a:srgbClr>
-          </a:solidFill>
-          <a:ln/>
-        </p:spPr>
-        <p:txBody>
-          <a:bodyPr wrap="square" rtlCol="0" anchor="ctr"/>
-          <a:lstStyle/>
-          <a:p>
-            <a:pPr indent="0" marL="0">
-              <a:buNone/>
-            </a:pPr>
-            <a:r>
-              <a:rPr lang="en-US" dirty="0">
-                <a:solidFill>
-                  <a:srgbClr val="000000"/>
-                </a:solidFill>
-              </a:rPr>
-              <a:t> </a:t>
-            </a:r>
-            <a:endParaRPr lang="en-US" dirty="0"/>
-          </a:p>
-        </p:txBody>
-      </p:sp>
-      <p:sp>
-        <p:nvSpPr>
-          <p:cNvPr id="8" name="Text 5"/>
-          <p:cNvSpPr/>
-          <p:nvPr/>
-        </p:nvSpPr>
-        <p:spPr>
-          <a:xfrm>
-            <a:off x="1208182" y="12423775"/>
-            <a:ext cx="713204" cy="127000"/>
-          </a:xfrm>
-          <a:prstGeom prst="rect">
-            <a:avLst/>
-          </a:prstGeom>
-          <a:solidFill>
-            <a:srgbClr val="FFFFFF">
-              <a:alpha val="0"/>
-            </a:srgbClr>
-          </a:solidFill>
-          <a:ln/>
-        </p:spPr>
-        <p:txBody>
-          <a:bodyPr wrap="square" rtlCol="0" anchor="ctr"/>
-          <a:lstStyle/>
-          <a:p>
-            <a:pPr indent="0" marL="0">
-              <a:buNone/>
-            </a:pPr>
-            <a:r>
-              <a:rPr lang="en-US" dirty="0">
-                <a:solidFill>
-                  <a:srgbClr val="000000"/>
-                </a:solidFill>
-              </a:rPr>
-              <a:t> </a:t>
-            </a:r>
-            <a:endParaRPr lang="en-US" dirty="0"/>
-          </a:p>
-        </p:txBody>
-      </p:sp>
-      <p:sp>
-        <p:nvSpPr>
-          <p:cNvPr id="9" name="Text 6"/>
-          <p:cNvSpPr/>
-          <p:nvPr/>
-        </p:nvSpPr>
-        <p:spPr>
-          <a:xfrm>
-            <a:off x="2022961" y="12423775"/>
-            <a:ext cx="710030" cy="127000"/>
-          </a:xfrm>
-          <a:prstGeom prst="rect">
-            <a:avLst/>
-          </a:prstGeom>
-          <a:solidFill>
-            <a:srgbClr val="FFFFFF">
-              <a:alpha val="0"/>
-            </a:srgbClr>
-          </a:solidFill>
-          <a:ln/>
-        </p:spPr>
-        <p:txBody>
-          <a:bodyPr wrap="square" rtlCol="0" anchor="ctr"/>
-          <a:lstStyle/>
-          <a:p>
-            <a:pPr indent="0" marL="0">
-              <a:buNone/>
-            </a:pPr>
-            <a:r>
-              <a:rPr lang="en-US" dirty="0">
-                <a:solidFill>
-                  <a:srgbClr val="000000"/>
-                </a:solidFill>
-              </a:rPr>
-              <a:t> </a:t>
-            </a:r>
-            <a:endParaRPr lang="en-US" dirty="0"/>
-          </a:p>
-        </p:txBody>
-      </p:sp>
-      <p:sp>
-        <p:nvSpPr>
-          <p:cNvPr id="10" name="Text 7"/>
-          <p:cNvSpPr/>
-          <p:nvPr/>
-        </p:nvSpPr>
-        <p:spPr>
-          <a:xfrm>
-            <a:off x="609448" y="35140900"/>
-            <a:ext cx="10970057" cy="304800"/>
+            <a:off x="2930884" y="-3209925"/>
+            <a:ext cx="611332" cy="101600"/>
           </a:xfrm>
           <a:prstGeom prst="rect">
             <a:avLst/>
@@ -2555,8 +2013,8 @@
         </p:nvSpPr>
         <p:spPr>
           <a:xfrm>
-            <a:off x="1124363" y="-17527885"/>
-            <a:ext cx="757247" cy="120650"/>
+            <a:off x="1257184" y="-18272125"/>
+            <a:ext cx="528505" cy="101600"/>
           </a:xfrm>
           <a:prstGeom prst="rect">
             <a:avLst/>
@@ -2595,8 +2053,8 @@
         </p:nvSpPr>
         <p:spPr>
           <a:xfrm>
-            <a:off x="1124363" y="-10826948"/>
-            <a:ext cx="958313" cy="120650"/>
+            <a:off x="1887264" y="-18272125"/>
+            <a:ext cx="649125" cy="101600"/>
           </a:xfrm>
           <a:prstGeom prst="rect">
             <a:avLst/>
@@ -2635,8 +2093,8 @@
         </p:nvSpPr>
         <p:spPr>
           <a:xfrm>
-            <a:off x="1208182" y="-3203575"/>
-            <a:ext cx="616590" cy="127000"/>
+            <a:off x="1257184" y="-11083925"/>
+            <a:ext cx="649125" cy="101600"/>
           </a:xfrm>
           <a:prstGeom prst="rect">
             <a:avLst/>
@@ -2675,8 +2133,8 @@
         </p:nvSpPr>
         <p:spPr>
           <a:xfrm>
-            <a:off x="1926346" y="-3203575"/>
-            <a:ext cx="656565" cy="127000"/>
+            <a:off x="2007884" y="-11083925"/>
+            <a:ext cx="821425" cy="101600"/>
           </a:xfrm>
           <a:prstGeom prst="rect">
             <a:avLst/>
@@ -2715,128 +2173,8 @@
         </p:nvSpPr>
         <p:spPr>
           <a:xfrm>
-            <a:off x="2684486" y="-3203575"/>
-            <a:ext cx="901772" cy="127000"/>
-          </a:xfrm>
-          <a:prstGeom prst="rect">
-            <a:avLst/>
-          </a:prstGeom>
-          <a:solidFill>
-            <a:srgbClr val="FFFFFF">
-              <a:alpha val="0"/>
-            </a:srgbClr>
-          </a:solidFill>
-          <a:ln/>
-        </p:spPr>
-        <p:txBody>
-          <a:bodyPr wrap="square" rtlCol="0" anchor="ctr"/>
-          <a:lstStyle/>
-          <a:p>
-            <a:pPr indent="0" marL="0">
-              <a:buNone/>
-            </a:pPr>
-            <a:r>
-              <a:rPr lang="en-US" dirty="0">
-                <a:solidFill>
-                  <a:srgbClr val="000000"/>
-                </a:solidFill>
-              </a:rPr>
-              <a:t> </a:t>
-            </a:r>
-            <a:endParaRPr lang="en-US" dirty="0"/>
-          </a:p>
-        </p:txBody>
-      </p:sp>
-      <p:sp>
-        <p:nvSpPr>
-          <p:cNvPr id="8" name="Text 5"/>
-          <p:cNvSpPr/>
-          <p:nvPr/>
-        </p:nvSpPr>
-        <p:spPr>
-          <a:xfrm>
-            <a:off x="1208182" y="4549775"/>
-            <a:ext cx="713204" cy="127000"/>
-          </a:xfrm>
-          <a:prstGeom prst="rect">
-            <a:avLst/>
-          </a:prstGeom>
-          <a:solidFill>
-            <a:srgbClr val="FFFFFF">
-              <a:alpha val="0"/>
-            </a:srgbClr>
-          </a:solidFill>
-          <a:ln/>
-        </p:spPr>
-        <p:txBody>
-          <a:bodyPr wrap="square" rtlCol="0" anchor="ctr"/>
-          <a:lstStyle/>
-          <a:p>
-            <a:pPr indent="0" marL="0">
-              <a:buNone/>
-            </a:pPr>
-            <a:r>
-              <a:rPr lang="en-US" dirty="0">
-                <a:solidFill>
-                  <a:srgbClr val="000000"/>
-                </a:solidFill>
-              </a:rPr>
-              <a:t> </a:t>
-            </a:r>
-            <a:endParaRPr lang="en-US" dirty="0"/>
-          </a:p>
-        </p:txBody>
-      </p:sp>
-      <p:sp>
-        <p:nvSpPr>
-          <p:cNvPr id="9" name="Text 6"/>
-          <p:cNvSpPr/>
-          <p:nvPr/>
-        </p:nvSpPr>
-        <p:spPr>
-          <a:xfrm>
-            <a:off x="2022961" y="4549775"/>
-            <a:ext cx="710030" cy="127000"/>
-          </a:xfrm>
-          <a:prstGeom prst="rect">
-            <a:avLst/>
-          </a:prstGeom>
-          <a:solidFill>
-            <a:srgbClr val="FFFFFF">
-              <a:alpha val="0"/>
-            </a:srgbClr>
-          </a:solidFill>
-          <a:ln/>
-        </p:spPr>
-        <p:txBody>
-          <a:bodyPr wrap="square" rtlCol="0" anchor="ctr"/>
-          <a:lstStyle/>
-          <a:p>
-            <a:pPr indent="0" marL="0">
-              <a:buNone/>
-            </a:pPr>
-            <a:r>
-              <a:rPr lang="en-US" dirty="0">
-                <a:solidFill>
-                  <a:srgbClr val="000000"/>
-                </a:solidFill>
-              </a:rPr>
-              <a:t> </a:t>
-            </a:r>
-            <a:endParaRPr lang="en-US" dirty="0"/>
-          </a:p>
-        </p:txBody>
-      </p:sp>
-      <p:sp>
-        <p:nvSpPr>
-          <p:cNvPr id="10" name="Text 7"/>
-          <p:cNvSpPr/>
-          <p:nvPr/>
-        </p:nvSpPr>
-        <p:spPr>
-          <a:xfrm>
-            <a:off x="609448" y="27266900"/>
-            <a:ext cx="10970057" cy="304800"/>
+            <a:off x="2930884" y="-11083925"/>
+            <a:ext cx="611332" cy="101600"/>
           </a:xfrm>
           <a:prstGeom prst="rect">
             <a:avLst/>
@@ -2924,8 +2262,8 @@
         </p:nvSpPr>
         <p:spPr>
           <a:xfrm>
-            <a:off x="1124363" y="-25401885"/>
-            <a:ext cx="757247" cy="120650"/>
+            <a:off x="1257184" y="-26146125"/>
+            <a:ext cx="528505" cy="101600"/>
           </a:xfrm>
           <a:prstGeom prst="rect">
             <a:avLst/>
@@ -2964,8 +2302,8 @@
         </p:nvSpPr>
         <p:spPr>
           <a:xfrm>
-            <a:off x="1124363" y="-18700948"/>
-            <a:ext cx="958313" cy="120650"/>
+            <a:off x="1887264" y="-26146125"/>
+            <a:ext cx="649125" cy="101600"/>
           </a:xfrm>
           <a:prstGeom prst="rect">
             <a:avLst/>
@@ -3004,8 +2342,8 @@
         </p:nvSpPr>
         <p:spPr>
           <a:xfrm>
-            <a:off x="1208182" y="-11077575"/>
-            <a:ext cx="616590" cy="127000"/>
+            <a:off x="1257184" y="-18957925"/>
+            <a:ext cx="649125" cy="101600"/>
           </a:xfrm>
           <a:prstGeom prst="rect">
             <a:avLst/>
@@ -3044,8 +2382,8 @@
         </p:nvSpPr>
         <p:spPr>
           <a:xfrm>
-            <a:off x="1926346" y="-11077575"/>
-            <a:ext cx="656565" cy="127000"/>
+            <a:off x="2007884" y="-18957925"/>
+            <a:ext cx="821425" cy="101600"/>
           </a:xfrm>
           <a:prstGeom prst="rect">
             <a:avLst/>
@@ -3084,866 +2422,8 @@
         </p:nvSpPr>
         <p:spPr>
           <a:xfrm>
-            <a:off x="2684486" y="-11077575"/>
-            <a:ext cx="901772" cy="127000"/>
-          </a:xfrm>
-          <a:prstGeom prst="rect">
-            <a:avLst/>
-          </a:prstGeom>
-          <a:solidFill>
-            <a:srgbClr val="FFFFFF">
-              <a:alpha val="0"/>
-            </a:srgbClr>
-          </a:solidFill>
-          <a:ln/>
-        </p:spPr>
-        <p:txBody>
-          <a:bodyPr wrap="square" rtlCol="0" anchor="ctr"/>
-          <a:lstStyle/>
-          <a:p>
-            <a:pPr indent="0" marL="0">
-              <a:buNone/>
-            </a:pPr>
-            <a:r>
-              <a:rPr lang="en-US" dirty="0">
-                <a:solidFill>
-                  <a:srgbClr val="000000"/>
-                </a:solidFill>
-              </a:rPr>
-              <a:t> </a:t>
-            </a:r>
-            <a:endParaRPr lang="en-US" dirty="0"/>
-          </a:p>
-        </p:txBody>
-      </p:sp>
-      <p:sp>
-        <p:nvSpPr>
-          <p:cNvPr id="8" name="Text 5"/>
-          <p:cNvSpPr/>
-          <p:nvPr/>
-        </p:nvSpPr>
-        <p:spPr>
-          <a:xfrm>
-            <a:off x="1208182" y="-3324225"/>
-            <a:ext cx="713204" cy="127000"/>
-          </a:xfrm>
-          <a:prstGeom prst="rect">
-            <a:avLst/>
-          </a:prstGeom>
-          <a:solidFill>
-            <a:srgbClr val="FFFFFF">
-              <a:alpha val="0"/>
-            </a:srgbClr>
-          </a:solidFill>
-          <a:ln/>
-        </p:spPr>
-        <p:txBody>
-          <a:bodyPr wrap="square" rtlCol="0" anchor="ctr"/>
-          <a:lstStyle/>
-          <a:p>
-            <a:pPr indent="0" marL="0">
-              <a:buNone/>
-            </a:pPr>
-            <a:r>
-              <a:rPr lang="en-US" dirty="0">
-                <a:solidFill>
-                  <a:srgbClr val="000000"/>
-                </a:solidFill>
-              </a:rPr>
-              <a:t> </a:t>
-            </a:r>
-            <a:endParaRPr lang="en-US" dirty="0"/>
-          </a:p>
-        </p:txBody>
-      </p:sp>
-      <p:sp>
-        <p:nvSpPr>
-          <p:cNvPr id="9" name="Text 6"/>
-          <p:cNvSpPr/>
-          <p:nvPr/>
-        </p:nvSpPr>
-        <p:spPr>
-          <a:xfrm>
-            <a:off x="2022961" y="-3324225"/>
-            <a:ext cx="710030" cy="127000"/>
-          </a:xfrm>
-          <a:prstGeom prst="rect">
-            <a:avLst/>
-          </a:prstGeom>
-          <a:solidFill>
-            <a:srgbClr val="FFFFFF">
-              <a:alpha val="0"/>
-            </a:srgbClr>
-          </a:solidFill>
-          <a:ln/>
-        </p:spPr>
-        <p:txBody>
-          <a:bodyPr wrap="square" rtlCol="0" anchor="ctr"/>
-          <a:lstStyle/>
-          <a:p>
-            <a:pPr indent="0" marL="0">
-              <a:buNone/>
-            </a:pPr>
-            <a:r>
-              <a:rPr lang="en-US" dirty="0">
-                <a:solidFill>
-                  <a:srgbClr val="000000"/>
-                </a:solidFill>
-              </a:rPr>
-              <a:t> </a:t>
-            </a:r>
-            <a:endParaRPr lang="en-US" dirty="0"/>
-          </a:p>
-        </p:txBody>
-      </p:sp>
-      <p:sp>
-        <p:nvSpPr>
-          <p:cNvPr id="10" name="Text 7"/>
-          <p:cNvSpPr/>
-          <p:nvPr/>
-        </p:nvSpPr>
-        <p:spPr>
-          <a:xfrm>
-            <a:off x="609448" y="19392900"/>
-            <a:ext cx="10970057" cy="304800"/>
-          </a:xfrm>
-          <a:prstGeom prst="rect">
-            <a:avLst/>
-          </a:prstGeom>
-          <a:solidFill>
-            <a:srgbClr val="FFFFFF">
-              <a:alpha val="0"/>
-            </a:srgbClr>
-          </a:solidFill>
-          <a:ln/>
-        </p:spPr>
-        <p:txBody>
-          <a:bodyPr wrap="square" rtlCol="0" anchor="ctr"/>
-          <a:lstStyle/>
-          <a:p>
-            <a:pPr indent="0" marL="0">
-              <a:buNone/>
-            </a:pPr>
-            <a:r>
-              <a:rPr lang="en-US" dirty="0">
-                <a:solidFill>
-                  <a:srgbClr val="000000"/>
-                </a:solidFill>
-              </a:rPr>
-              <a:t> </a:t>
-            </a:r>
-            <a:endParaRPr lang="en-US" dirty="0"/>
-          </a:p>
-        </p:txBody>
-      </p:sp>
-    </p:spTree>
-  </p:cSld>
-  <p:clrMapOvr>
-    <a:masterClrMapping/>
-  </p:clrMapOvr>
-</p:sld>
-</file>
-
-<file path=ppt/slides/slide6.xml><?xml version="1.0" encoding="utf-8"?>
-<p:sld xmlns:a="http://schemas.openxmlformats.org/drawingml/2006/main" xmlns:r="http://schemas.openxmlformats.org/officeDocument/2006/relationships" xmlns:p="http://schemas.openxmlformats.org/presentationml/2006/main">
-  <p:cSld name="Slide 6">
-    <p:spTree>
-      <p:nvGrpSpPr>
-        <p:cNvPr id="1" name=""/>
-        <p:cNvGrpSpPr/>
-        <p:nvPr/>
-      </p:nvGrpSpPr>
-      <p:grpSpPr>
-        <a:xfrm>
-          <a:off x="0" y="0"/>
-          <a:ext cx="0" cy="0"/>
-          <a:chOff x="0" y="0"/>
-          <a:chExt cx="0" cy="0"/>
-        </a:xfrm>
-      </p:grpSpPr>
-      <p:pic>
-        <p:nvPicPr>
-          <p:cNvPr id="2" name="Image 0" descr="preencoded.png">    </p:cNvPr>
-          <p:cNvPicPr>
-            <a:picLocks noChangeAspect="1"/>
-          </p:cNvPicPr>
-          <p:nvPr/>
-        </p:nvPicPr>
-        <p:blipFill>
-          <a:blip r:embed="rId1"/>
-          <a:stretch>
-            <a:fillRect/>
-          </a:stretch>
-        </p:blipFill>
-        <p:spPr>
-          <a:xfrm>
-            <a:off x="0" y="0"/>
-            <a:ext cx="12188952" cy="6858000"/>
-          </a:xfrm>
-          <a:prstGeom prst="rect">
-            <a:avLst/>
-          </a:prstGeom>
-        </p:spPr>
-      </p:pic>
-      <p:sp>
-        <p:nvSpPr>
-          <p:cNvPr id="3" name="Text 0"/>
-          <p:cNvSpPr/>
-          <p:nvPr/>
-        </p:nvSpPr>
-        <p:spPr>
-          <a:xfrm>
-            <a:off x="1124363" y="-33275885"/>
-            <a:ext cx="757247" cy="120650"/>
-          </a:xfrm>
-          <a:prstGeom prst="rect">
-            <a:avLst/>
-          </a:prstGeom>
-          <a:solidFill>
-            <a:srgbClr val="FFFFFF">
-              <a:alpha val="0"/>
-            </a:srgbClr>
-          </a:solidFill>
-          <a:ln/>
-        </p:spPr>
-        <p:txBody>
-          <a:bodyPr wrap="square" rtlCol="0" anchor="ctr"/>
-          <a:lstStyle/>
-          <a:p>
-            <a:pPr indent="0" marL="0">
-              <a:buNone/>
-            </a:pPr>
-            <a:r>
-              <a:rPr lang="en-US" dirty="0">
-                <a:solidFill>
-                  <a:srgbClr val="000000"/>
-                </a:solidFill>
-              </a:rPr>
-              <a:t> </a:t>
-            </a:r>
-            <a:endParaRPr lang="en-US" dirty="0"/>
-          </a:p>
-        </p:txBody>
-      </p:sp>
-      <p:sp>
-        <p:nvSpPr>
-          <p:cNvPr id="4" name="Text 1"/>
-          <p:cNvSpPr/>
-          <p:nvPr/>
-        </p:nvSpPr>
-        <p:spPr>
-          <a:xfrm>
-            <a:off x="1124363" y="-26574948"/>
-            <a:ext cx="958313" cy="120650"/>
-          </a:xfrm>
-          <a:prstGeom prst="rect">
-            <a:avLst/>
-          </a:prstGeom>
-          <a:solidFill>
-            <a:srgbClr val="FFFFFF">
-              <a:alpha val="0"/>
-            </a:srgbClr>
-          </a:solidFill>
-          <a:ln/>
-        </p:spPr>
-        <p:txBody>
-          <a:bodyPr wrap="square" rtlCol="0" anchor="ctr"/>
-          <a:lstStyle/>
-          <a:p>
-            <a:pPr indent="0" marL="0">
-              <a:buNone/>
-            </a:pPr>
-            <a:r>
-              <a:rPr lang="en-US" dirty="0">
-                <a:solidFill>
-                  <a:srgbClr val="000000"/>
-                </a:solidFill>
-              </a:rPr>
-              <a:t> </a:t>
-            </a:r>
-            <a:endParaRPr lang="en-US" dirty="0"/>
-          </a:p>
-        </p:txBody>
-      </p:sp>
-      <p:sp>
-        <p:nvSpPr>
-          <p:cNvPr id="5" name="Text 2"/>
-          <p:cNvSpPr/>
-          <p:nvPr/>
-        </p:nvSpPr>
-        <p:spPr>
-          <a:xfrm>
-            <a:off x="1208182" y="-18951575"/>
-            <a:ext cx="616590" cy="127000"/>
-          </a:xfrm>
-          <a:prstGeom prst="rect">
-            <a:avLst/>
-          </a:prstGeom>
-          <a:solidFill>
-            <a:srgbClr val="FFFFFF">
-              <a:alpha val="0"/>
-            </a:srgbClr>
-          </a:solidFill>
-          <a:ln/>
-        </p:spPr>
-        <p:txBody>
-          <a:bodyPr wrap="square" rtlCol="0" anchor="ctr"/>
-          <a:lstStyle/>
-          <a:p>
-            <a:pPr indent="0" marL="0">
-              <a:buNone/>
-            </a:pPr>
-            <a:r>
-              <a:rPr lang="en-US" dirty="0">
-                <a:solidFill>
-                  <a:srgbClr val="000000"/>
-                </a:solidFill>
-              </a:rPr>
-              <a:t> </a:t>
-            </a:r>
-            <a:endParaRPr lang="en-US" dirty="0"/>
-          </a:p>
-        </p:txBody>
-      </p:sp>
-      <p:sp>
-        <p:nvSpPr>
-          <p:cNvPr id="6" name="Text 3"/>
-          <p:cNvSpPr/>
-          <p:nvPr/>
-        </p:nvSpPr>
-        <p:spPr>
-          <a:xfrm>
-            <a:off x="1926346" y="-18951575"/>
-            <a:ext cx="656565" cy="127000"/>
-          </a:xfrm>
-          <a:prstGeom prst="rect">
-            <a:avLst/>
-          </a:prstGeom>
-          <a:solidFill>
-            <a:srgbClr val="FFFFFF">
-              <a:alpha val="0"/>
-            </a:srgbClr>
-          </a:solidFill>
-          <a:ln/>
-        </p:spPr>
-        <p:txBody>
-          <a:bodyPr wrap="square" rtlCol="0" anchor="ctr"/>
-          <a:lstStyle/>
-          <a:p>
-            <a:pPr indent="0" marL="0">
-              <a:buNone/>
-            </a:pPr>
-            <a:r>
-              <a:rPr lang="en-US" dirty="0">
-                <a:solidFill>
-                  <a:srgbClr val="000000"/>
-                </a:solidFill>
-              </a:rPr>
-              <a:t> </a:t>
-            </a:r>
-            <a:endParaRPr lang="en-US" dirty="0"/>
-          </a:p>
-        </p:txBody>
-      </p:sp>
-      <p:sp>
-        <p:nvSpPr>
-          <p:cNvPr id="7" name="Text 4"/>
-          <p:cNvSpPr/>
-          <p:nvPr/>
-        </p:nvSpPr>
-        <p:spPr>
-          <a:xfrm>
-            <a:off x="2684486" y="-18951575"/>
-            <a:ext cx="901772" cy="127000"/>
-          </a:xfrm>
-          <a:prstGeom prst="rect">
-            <a:avLst/>
-          </a:prstGeom>
-          <a:solidFill>
-            <a:srgbClr val="FFFFFF">
-              <a:alpha val="0"/>
-            </a:srgbClr>
-          </a:solidFill>
-          <a:ln/>
-        </p:spPr>
-        <p:txBody>
-          <a:bodyPr wrap="square" rtlCol="0" anchor="ctr"/>
-          <a:lstStyle/>
-          <a:p>
-            <a:pPr indent="0" marL="0">
-              <a:buNone/>
-            </a:pPr>
-            <a:r>
-              <a:rPr lang="en-US" dirty="0">
-                <a:solidFill>
-                  <a:srgbClr val="000000"/>
-                </a:solidFill>
-              </a:rPr>
-              <a:t> </a:t>
-            </a:r>
-            <a:endParaRPr lang="en-US" dirty="0"/>
-          </a:p>
-        </p:txBody>
-      </p:sp>
-      <p:sp>
-        <p:nvSpPr>
-          <p:cNvPr id="8" name="Text 5"/>
-          <p:cNvSpPr/>
-          <p:nvPr/>
-        </p:nvSpPr>
-        <p:spPr>
-          <a:xfrm>
-            <a:off x="1208182" y="-11198225"/>
-            <a:ext cx="713204" cy="127000"/>
-          </a:xfrm>
-          <a:prstGeom prst="rect">
-            <a:avLst/>
-          </a:prstGeom>
-          <a:solidFill>
-            <a:srgbClr val="FFFFFF">
-              <a:alpha val="0"/>
-            </a:srgbClr>
-          </a:solidFill>
-          <a:ln/>
-        </p:spPr>
-        <p:txBody>
-          <a:bodyPr wrap="square" rtlCol="0" anchor="ctr"/>
-          <a:lstStyle/>
-          <a:p>
-            <a:pPr indent="0" marL="0">
-              <a:buNone/>
-            </a:pPr>
-            <a:r>
-              <a:rPr lang="en-US" dirty="0">
-                <a:solidFill>
-                  <a:srgbClr val="000000"/>
-                </a:solidFill>
-              </a:rPr>
-              <a:t> </a:t>
-            </a:r>
-            <a:endParaRPr lang="en-US" dirty="0"/>
-          </a:p>
-        </p:txBody>
-      </p:sp>
-      <p:sp>
-        <p:nvSpPr>
-          <p:cNvPr id="9" name="Text 6"/>
-          <p:cNvSpPr/>
-          <p:nvPr/>
-        </p:nvSpPr>
-        <p:spPr>
-          <a:xfrm>
-            <a:off x="2022961" y="-11198225"/>
-            <a:ext cx="710030" cy="127000"/>
-          </a:xfrm>
-          <a:prstGeom prst="rect">
-            <a:avLst/>
-          </a:prstGeom>
-          <a:solidFill>
-            <a:srgbClr val="FFFFFF">
-              <a:alpha val="0"/>
-            </a:srgbClr>
-          </a:solidFill>
-          <a:ln/>
-        </p:spPr>
-        <p:txBody>
-          <a:bodyPr wrap="square" rtlCol="0" anchor="ctr"/>
-          <a:lstStyle/>
-          <a:p>
-            <a:pPr indent="0" marL="0">
-              <a:buNone/>
-            </a:pPr>
-            <a:r>
-              <a:rPr lang="en-US" dirty="0">
-                <a:solidFill>
-                  <a:srgbClr val="000000"/>
-                </a:solidFill>
-              </a:rPr>
-              <a:t> </a:t>
-            </a:r>
-            <a:endParaRPr lang="en-US" dirty="0"/>
-          </a:p>
-        </p:txBody>
-      </p:sp>
-      <p:sp>
-        <p:nvSpPr>
-          <p:cNvPr id="10" name="Text 7"/>
-          <p:cNvSpPr/>
-          <p:nvPr/>
-        </p:nvSpPr>
-        <p:spPr>
-          <a:xfrm>
-            <a:off x="609448" y="11518900"/>
-            <a:ext cx="10970057" cy="304800"/>
-          </a:xfrm>
-          <a:prstGeom prst="rect">
-            <a:avLst/>
-          </a:prstGeom>
-          <a:solidFill>
-            <a:srgbClr val="FFFFFF">
-              <a:alpha val="0"/>
-            </a:srgbClr>
-          </a:solidFill>
-          <a:ln/>
-        </p:spPr>
-        <p:txBody>
-          <a:bodyPr wrap="square" rtlCol="0" anchor="ctr"/>
-          <a:lstStyle/>
-          <a:p>
-            <a:pPr indent="0" marL="0">
-              <a:buNone/>
-            </a:pPr>
-            <a:r>
-              <a:rPr lang="en-US" dirty="0">
-                <a:solidFill>
-                  <a:srgbClr val="000000"/>
-                </a:solidFill>
-              </a:rPr>
-              <a:t> </a:t>
-            </a:r>
-            <a:endParaRPr lang="en-US" dirty="0"/>
-          </a:p>
-        </p:txBody>
-      </p:sp>
-    </p:spTree>
-  </p:cSld>
-  <p:clrMapOvr>
-    <a:masterClrMapping/>
-  </p:clrMapOvr>
-</p:sld>
-</file>
-
-<file path=ppt/slides/slide7.xml><?xml version="1.0" encoding="utf-8"?>
-<p:sld xmlns:a="http://schemas.openxmlformats.org/drawingml/2006/main" xmlns:r="http://schemas.openxmlformats.org/officeDocument/2006/relationships" xmlns:p="http://schemas.openxmlformats.org/presentationml/2006/main">
-  <p:cSld name="Slide 7">
-    <p:spTree>
-      <p:nvGrpSpPr>
-        <p:cNvPr id="1" name=""/>
-        <p:cNvGrpSpPr/>
-        <p:nvPr/>
-      </p:nvGrpSpPr>
-      <p:grpSpPr>
-        <a:xfrm>
-          <a:off x="0" y="0"/>
-          <a:ext cx="0" cy="0"/>
-          <a:chOff x="0" y="0"/>
-          <a:chExt cx="0" cy="0"/>
-        </a:xfrm>
-      </p:grpSpPr>
-      <p:pic>
-        <p:nvPicPr>
-          <p:cNvPr id="2" name="Image 0" descr="preencoded.png">    </p:cNvPr>
-          <p:cNvPicPr>
-            <a:picLocks noChangeAspect="1"/>
-          </p:cNvPicPr>
-          <p:nvPr/>
-        </p:nvPicPr>
-        <p:blipFill>
-          <a:blip r:embed="rId1"/>
-          <a:stretch>
-            <a:fillRect/>
-          </a:stretch>
-        </p:blipFill>
-        <p:spPr>
-          <a:xfrm>
-            <a:off x="0" y="0"/>
-            <a:ext cx="12188952" cy="6858000"/>
-          </a:xfrm>
-          <a:prstGeom prst="rect">
-            <a:avLst/>
-          </a:prstGeom>
-        </p:spPr>
-      </p:pic>
-      <p:sp>
-        <p:nvSpPr>
-          <p:cNvPr id="3" name="Text 0"/>
-          <p:cNvSpPr/>
-          <p:nvPr/>
-        </p:nvSpPr>
-        <p:spPr>
-          <a:xfrm>
-            <a:off x="1124363" y="-41149885"/>
-            <a:ext cx="757247" cy="120650"/>
-          </a:xfrm>
-          <a:prstGeom prst="rect">
-            <a:avLst/>
-          </a:prstGeom>
-          <a:solidFill>
-            <a:srgbClr val="FFFFFF">
-              <a:alpha val="0"/>
-            </a:srgbClr>
-          </a:solidFill>
-          <a:ln/>
-        </p:spPr>
-        <p:txBody>
-          <a:bodyPr wrap="square" rtlCol="0" anchor="ctr"/>
-          <a:lstStyle/>
-          <a:p>
-            <a:pPr indent="0" marL="0">
-              <a:buNone/>
-            </a:pPr>
-            <a:r>
-              <a:rPr lang="en-US" dirty="0">
-                <a:solidFill>
-                  <a:srgbClr val="000000"/>
-                </a:solidFill>
-              </a:rPr>
-              <a:t> </a:t>
-            </a:r>
-            <a:endParaRPr lang="en-US" dirty="0"/>
-          </a:p>
-        </p:txBody>
-      </p:sp>
-      <p:sp>
-        <p:nvSpPr>
-          <p:cNvPr id="4" name="Text 1"/>
-          <p:cNvSpPr/>
-          <p:nvPr/>
-        </p:nvSpPr>
-        <p:spPr>
-          <a:xfrm>
-            <a:off x="1124363" y="-34448948"/>
-            <a:ext cx="958313" cy="120650"/>
-          </a:xfrm>
-          <a:prstGeom prst="rect">
-            <a:avLst/>
-          </a:prstGeom>
-          <a:solidFill>
-            <a:srgbClr val="FFFFFF">
-              <a:alpha val="0"/>
-            </a:srgbClr>
-          </a:solidFill>
-          <a:ln/>
-        </p:spPr>
-        <p:txBody>
-          <a:bodyPr wrap="square" rtlCol="0" anchor="ctr"/>
-          <a:lstStyle/>
-          <a:p>
-            <a:pPr indent="0" marL="0">
-              <a:buNone/>
-            </a:pPr>
-            <a:r>
-              <a:rPr lang="en-US" dirty="0">
-                <a:solidFill>
-                  <a:srgbClr val="000000"/>
-                </a:solidFill>
-              </a:rPr>
-              <a:t> </a:t>
-            </a:r>
-            <a:endParaRPr lang="en-US" dirty="0"/>
-          </a:p>
-        </p:txBody>
-      </p:sp>
-      <p:sp>
-        <p:nvSpPr>
-          <p:cNvPr id="5" name="Text 2"/>
-          <p:cNvSpPr/>
-          <p:nvPr/>
-        </p:nvSpPr>
-        <p:spPr>
-          <a:xfrm>
-            <a:off x="1208182" y="-26825575"/>
-            <a:ext cx="616590" cy="127000"/>
-          </a:xfrm>
-          <a:prstGeom prst="rect">
-            <a:avLst/>
-          </a:prstGeom>
-          <a:solidFill>
-            <a:srgbClr val="FFFFFF">
-              <a:alpha val="0"/>
-            </a:srgbClr>
-          </a:solidFill>
-          <a:ln/>
-        </p:spPr>
-        <p:txBody>
-          <a:bodyPr wrap="square" rtlCol="0" anchor="ctr"/>
-          <a:lstStyle/>
-          <a:p>
-            <a:pPr indent="0" marL="0">
-              <a:buNone/>
-            </a:pPr>
-            <a:r>
-              <a:rPr lang="en-US" dirty="0">
-                <a:solidFill>
-                  <a:srgbClr val="000000"/>
-                </a:solidFill>
-              </a:rPr>
-              <a:t> </a:t>
-            </a:r>
-            <a:endParaRPr lang="en-US" dirty="0"/>
-          </a:p>
-        </p:txBody>
-      </p:sp>
-      <p:sp>
-        <p:nvSpPr>
-          <p:cNvPr id="6" name="Text 3"/>
-          <p:cNvSpPr/>
-          <p:nvPr/>
-        </p:nvSpPr>
-        <p:spPr>
-          <a:xfrm>
-            <a:off x="1926346" y="-26825575"/>
-            <a:ext cx="656565" cy="127000"/>
-          </a:xfrm>
-          <a:prstGeom prst="rect">
-            <a:avLst/>
-          </a:prstGeom>
-          <a:solidFill>
-            <a:srgbClr val="FFFFFF">
-              <a:alpha val="0"/>
-            </a:srgbClr>
-          </a:solidFill>
-          <a:ln/>
-        </p:spPr>
-        <p:txBody>
-          <a:bodyPr wrap="square" rtlCol="0" anchor="ctr"/>
-          <a:lstStyle/>
-          <a:p>
-            <a:pPr indent="0" marL="0">
-              <a:buNone/>
-            </a:pPr>
-            <a:r>
-              <a:rPr lang="en-US" dirty="0">
-                <a:solidFill>
-                  <a:srgbClr val="000000"/>
-                </a:solidFill>
-              </a:rPr>
-              <a:t> </a:t>
-            </a:r>
-            <a:endParaRPr lang="en-US" dirty="0"/>
-          </a:p>
-        </p:txBody>
-      </p:sp>
-      <p:sp>
-        <p:nvSpPr>
-          <p:cNvPr id="7" name="Text 4"/>
-          <p:cNvSpPr/>
-          <p:nvPr/>
-        </p:nvSpPr>
-        <p:spPr>
-          <a:xfrm>
-            <a:off x="2684486" y="-26825575"/>
-            <a:ext cx="901772" cy="127000"/>
-          </a:xfrm>
-          <a:prstGeom prst="rect">
-            <a:avLst/>
-          </a:prstGeom>
-          <a:solidFill>
-            <a:srgbClr val="FFFFFF">
-              <a:alpha val="0"/>
-            </a:srgbClr>
-          </a:solidFill>
-          <a:ln/>
-        </p:spPr>
-        <p:txBody>
-          <a:bodyPr wrap="square" rtlCol="0" anchor="ctr"/>
-          <a:lstStyle/>
-          <a:p>
-            <a:pPr indent="0" marL="0">
-              <a:buNone/>
-            </a:pPr>
-            <a:r>
-              <a:rPr lang="en-US" dirty="0">
-                <a:solidFill>
-                  <a:srgbClr val="000000"/>
-                </a:solidFill>
-              </a:rPr>
-              <a:t> </a:t>
-            </a:r>
-            <a:endParaRPr lang="en-US" dirty="0"/>
-          </a:p>
-        </p:txBody>
-      </p:sp>
-      <p:sp>
-        <p:nvSpPr>
-          <p:cNvPr id="8" name="Text 5"/>
-          <p:cNvSpPr/>
-          <p:nvPr/>
-        </p:nvSpPr>
-        <p:spPr>
-          <a:xfrm>
-            <a:off x="1208182" y="-19072225"/>
-            <a:ext cx="713204" cy="127000"/>
-          </a:xfrm>
-          <a:prstGeom prst="rect">
-            <a:avLst/>
-          </a:prstGeom>
-          <a:solidFill>
-            <a:srgbClr val="FFFFFF">
-              <a:alpha val="0"/>
-            </a:srgbClr>
-          </a:solidFill>
-          <a:ln/>
-        </p:spPr>
-        <p:txBody>
-          <a:bodyPr wrap="square" rtlCol="0" anchor="ctr"/>
-          <a:lstStyle/>
-          <a:p>
-            <a:pPr indent="0" marL="0">
-              <a:buNone/>
-            </a:pPr>
-            <a:r>
-              <a:rPr lang="en-US" dirty="0">
-                <a:solidFill>
-                  <a:srgbClr val="000000"/>
-                </a:solidFill>
-              </a:rPr>
-              <a:t> </a:t>
-            </a:r>
-            <a:endParaRPr lang="en-US" dirty="0"/>
-          </a:p>
-        </p:txBody>
-      </p:sp>
-      <p:sp>
-        <p:nvSpPr>
-          <p:cNvPr id="9" name="Text 6"/>
-          <p:cNvSpPr/>
-          <p:nvPr/>
-        </p:nvSpPr>
-        <p:spPr>
-          <a:xfrm>
-            <a:off x="2022961" y="-19072225"/>
-            <a:ext cx="710030" cy="127000"/>
-          </a:xfrm>
-          <a:prstGeom prst="rect">
-            <a:avLst/>
-          </a:prstGeom>
-          <a:solidFill>
-            <a:srgbClr val="FFFFFF">
-              <a:alpha val="0"/>
-            </a:srgbClr>
-          </a:solidFill>
-          <a:ln/>
-        </p:spPr>
-        <p:txBody>
-          <a:bodyPr wrap="square" rtlCol="0" anchor="ctr"/>
-          <a:lstStyle/>
-          <a:p>
-            <a:pPr indent="0" marL="0">
-              <a:buNone/>
-            </a:pPr>
-            <a:r>
-              <a:rPr lang="en-US" dirty="0">
-                <a:solidFill>
-                  <a:srgbClr val="000000"/>
-                </a:solidFill>
-              </a:rPr>
-              <a:t> </a:t>
-            </a:r>
-            <a:endParaRPr lang="en-US" dirty="0"/>
-          </a:p>
-        </p:txBody>
-      </p:sp>
-      <p:sp>
-        <p:nvSpPr>
-          <p:cNvPr id="10" name="Text 7"/>
-          <p:cNvSpPr/>
-          <p:nvPr/>
-        </p:nvSpPr>
-        <p:spPr>
-          <a:xfrm>
-            <a:off x="609448" y="3644900"/>
-            <a:ext cx="10970057" cy="304800"/>
+            <a:off x="2930884" y="-18957925"/>
+            <a:ext cx="611332" cy="101600"/>
           </a:xfrm>
           <a:prstGeom prst="rect">
             <a:avLst/>

</xml_diff>